<commit_message>
Updates for Lecture 9
</commit_message>
<xml_diff>
--- a/Lecture/images/bobs-images.pptx
+++ b/Lecture/images/bobs-images.pptx
@@ -4696,8 +4696,8 @@
         </p:nvCxnSpPr>
         <p:spPr>
           <a:xfrm>
-            <a:off x="2745344" y="4221139"/>
-            <a:ext cx="731269" cy="311907"/>
+            <a:off x="6220222" y="3835873"/>
+            <a:ext cx="809843" cy="457200"/>
           </a:xfrm>
           <a:prstGeom prst="straightConnector1">
             <a:avLst/>
@@ -4732,157 +4732,9 @@
           <p:nvPr/>
         </p:nvCxnSpPr>
         <p:spPr>
-          <a:xfrm>
-            <a:off x="2897744" y="4373539"/>
-            <a:ext cx="731269" cy="311907"/>
-          </a:xfrm>
-          <a:prstGeom prst="straightConnector1">
-            <a:avLst/>
-          </a:prstGeom>
-          <a:ln w="12700" cmpd="sng">
-            <a:solidFill>
-              <a:schemeClr val="tx1"/>
-            </a:solidFill>
-            <a:tailEnd type="arrow"/>
-          </a:ln>
-          <a:effectLst/>
-        </p:spPr>
-        <p:style>
-          <a:lnRef idx="2">
-            <a:schemeClr val="accent1"/>
-          </a:lnRef>
-          <a:fillRef idx="0">
-            <a:schemeClr val="accent1"/>
-          </a:fillRef>
-          <a:effectRef idx="1">
-            <a:schemeClr val="accent1"/>
-          </a:effectRef>
-          <a:fontRef idx="minor">
-            <a:schemeClr val="tx1"/>
-          </a:fontRef>
-        </p:style>
-      </p:cxnSp>
-      <p:cxnSp>
-        <p:nvCxnSpPr>
-          <p:cNvPr id="25" name="Straight Arrow Connector 24"/>
-          <p:cNvCxnSpPr/>
-          <p:nvPr/>
-        </p:nvCxnSpPr>
-        <p:spPr>
-          <a:xfrm>
-            <a:off x="3050144" y="4525939"/>
-            <a:ext cx="731269" cy="311907"/>
-          </a:xfrm>
-          <a:prstGeom prst="straightConnector1">
-            <a:avLst/>
-          </a:prstGeom>
-          <a:ln w="12700" cmpd="sng">
-            <a:solidFill>
-              <a:schemeClr val="tx1"/>
-            </a:solidFill>
-            <a:tailEnd type="arrow"/>
-          </a:ln>
-          <a:effectLst/>
-        </p:spPr>
-        <p:style>
-          <a:lnRef idx="2">
-            <a:schemeClr val="accent1"/>
-          </a:lnRef>
-          <a:fillRef idx="0">
-            <a:schemeClr val="accent1"/>
-          </a:fillRef>
-          <a:effectRef idx="1">
-            <a:schemeClr val="accent1"/>
-          </a:effectRef>
-          <a:fontRef idx="minor">
-            <a:schemeClr val="tx1"/>
-          </a:fontRef>
-        </p:style>
-      </p:cxnSp>
-      <p:cxnSp>
-        <p:nvCxnSpPr>
-          <p:cNvPr id="26" name="Straight Arrow Connector 25"/>
-          <p:cNvCxnSpPr/>
-          <p:nvPr/>
-        </p:nvCxnSpPr>
-        <p:spPr>
-          <a:xfrm>
-            <a:off x="3202544" y="4678339"/>
-            <a:ext cx="731269" cy="311907"/>
-          </a:xfrm>
-          <a:prstGeom prst="straightConnector1">
-            <a:avLst/>
-          </a:prstGeom>
-          <a:ln w="12700" cmpd="sng">
-            <a:solidFill>
-              <a:schemeClr val="tx1"/>
-            </a:solidFill>
-            <a:tailEnd type="arrow"/>
-          </a:ln>
-          <a:effectLst/>
-        </p:spPr>
-        <p:style>
-          <a:lnRef idx="2">
-            <a:schemeClr val="accent1"/>
-          </a:lnRef>
-          <a:fillRef idx="0">
-            <a:schemeClr val="accent1"/>
-          </a:fillRef>
-          <a:effectRef idx="1">
-            <a:schemeClr val="accent1"/>
-          </a:effectRef>
-          <a:fontRef idx="minor">
-            <a:schemeClr val="tx1"/>
-          </a:fontRef>
-        </p:style>
-      </p:cxnSp>
-      <p:cxnSp>
-        <p:nvCxnSpPr>
-          <p:cNvPr id="27" name="Straight Arrow Connector 26"/>
-          <p:cNvCxnSpPr/>
-          <p:nvPr/>
-        </p:nvCxnSpPr>
-        <p:spPr>
-          <a:xfrm>
-            <a:off x="3354944" y="4830739"/>
-            <a:ext cx="731269" cy="311907"/>
-          </a:xfrm>
-          <a:prstGeom prst="straightConnector1">
-            <a:avLst/>
-          </a:prstGeom>
-          <a:ln w="12700" cmpd="sng">
-            <a:solidFill>
-              <a:schemeClr val="tx1"/>
-            </a:solidFill>
-            <a:tailEnd type="arrow"/>
-          </a:ln>
-          <a:effectLst/>
-        </p:spPr>
-        <p:style>
-          <a:lnRef idx="2">
-            <a:schemeClr val="accent1"/>
-          </a:lnRef>
-          <a:fillRef idx="0">
-            <a:schemeClr val="accent1"/>
-          </a:fillRef>
-          <a:effectRef idx="1">
-            <a:schemeClr val="accent1"/>
-          </a:effectRef>
-          <a:fontRef idx="minor">
-            <a:schemeClr val="tx1"/>
-          </a:fontRef>
-        </p:style>
-      </p:cxnSp>
-      <p:cxnSp>
-        <p:nvCxnSpPr>
-          <p:cNvPr id="28" name="Straight Arrow Connector 27"/>
-          <p:cNvCxnSpPr/>
-          <p:nvPr/>
-        </p:nvCxnSpPr>
-        <p:spPr>
-          <a:xfrm>
-            <a:off x="3507344" y="4983139"/>
-            <a:ext cx="731269" cy="311907"/>
+          <a:xfrm flipH="1">
+            <a:off x="5571613" y="3835873"/>
+            <a:ext cx="611850" cy="457200"/>
           </a:xfrm>
           <a:prstGeom prst="straightConnector1">
             <a:avLst/>
@@ -5567,7 +5419,7 @@
         </p:nvSpPr>
         <p:spPr>
           <a:xfrm>
-            <a:off x="5304661" y="4163714"/>
+            <a:off x="5422464" y="4213455"/>
             <a:ext cx="2681312" cy="369332"/>
           </a:xfrm>
           <a:prstGeom prst="rect">
@@ -5605,8 +5457,8 @@
         </p:nvSpPr>
         <p:spPr>
           <a:xfrm>
-            <a:off x="4497982" y="5047167"/>
-            <a:ext cx="3476710" cy="369332"/>
+            <a:off x="5235442" y="5071749"/>
+            <a:ext cx="2654986" cy="369332"/>
           </a:xfrm>
           <a:prstGeom prst="rect">
             <a:avLst/>
@@ -5643,8 +5495,8 @@
         </p:nvSpPr>
         <p:spPr>
           <a:xfrm>
-            <a:off x="4509263" y="5751171"/>
-            <a:ext cx="3476710" cy="369332"/>
+            <a:off x="5607259" y="5824917"/>
+            <a:ext cx="2039834" cy="369332"/>
           </a:xfrm>
           <a:prstGeom prst="rect">
             <a:avLst/>
@@ -5659,7 +5511,7 @@
           <a:p>
             <a:r>
               <a:rPr lang="en-US" dirty="0" smtClean="0"/>
-              <a:t>                b                      c</a:t>
+              <a:t>b                      c</a:t>
             </a:r>
             <a:endParaRPr lang="en-US" i="1" dirty="0"/>
           </a:p>
@@ -5673,7 +5525,7 @@
         </p:nvCxnSpPr>
         <p:spPr>
           <a:xfrm>
-            <a:off x="7428150" y="5386534"/>
+            <a:off x="7010256" y="5411116"/>
             <a:ext cx="0" cy="457200"/>
           </a:xfrm>
           <a:prstGeom prst="straightConnector1">
@@ -5710,8 +5562,8 @@
         </p:nvCxnSpPr>
         <p:spPr>
           <a:xfrm>
-            <a:off x="6173247" y="4533047"/>
-            <a:ext cx="1108660" cy="606045"/>
+            <a:off x="6279769" y="4557629"/>
+            <a:ext cx="750296" cy="514120"/>
           </a:xfrm>
           <a:prstGeom prst="straightConnector1">
             <a:avLst/>
@@ -5747,8 +5599,8 @@
         </p:nvCxnSpPr>
         <p:spPr>
           <a:xfrm flipH="1">
-            <a:off x="4908509" y="4533047"/>
-            <a:ext cx="1263672" cy="606045"/>
+            <a:off x="5571613" y="4557629"/>
+            <a:ext cx="707090" cy="514120"/>
           </a:xfrm>
           <a:prstGeom prst="straightConnector1">
             <a:avLst/>
@@ -5784,7 +5636,7 @@
         </p:nvCxnSpPr>
         <p:spPr>
           <a:xfrm>
-            <a:off x="6218438" y="5367692"/>
+            <a:off x="6278238" y="4584765"/>
             <a:ext cx="0" cy="457200"/>
           </a:xfrm>
           <a:prstGeom prst="straightConnector1">
@@ -5821,7 +5673,44 @@
         </p:nvCxnSpPr>
         <p:spPr>
           <a:xfrm>
-            <a:off x="4994322" y="5386534"/>
+            <a:off x="5748170" y="5411116"/>
+            <a:ext cx="0" cy="457200"/>
+          </a:xfrm>
+          <a:prstGeom prst="straightConnector1">
+            <a:avLst/>
+          </a:prstGeom>
+          <a:ln w="12700" cmpd="sng">
+            <a:solidFill>
+              <a:schemeClr val="tx1"/>
+            </a:solidFill>
+            <a:tailEnd type="arrow"/>
+          </a:ln>
+          <a:effectLst/>
+        </p:spPr>
+        <p:style>
+          <a:lnRef idx="2">
+            <a:schemeClr val="accent1"/>
+          </a:lnRef>
+          <a:fillRef idx="0">
+            <a:schemeClr val="accent1"/>
+          </a:fillRef>
+          <a:effectRef idx="1">
+            <a:schemeClr val="accent1"/>
+          </a:effectRef>
+          <a:fontRef idx="minor">
+            <a:schemeClr val="tx1"/>
+          </a:fontRef>
+        </p:style>
+      </p:cxnSp>
+      <p:cxnSp>
+        <p:nvCxnSpPr>
+          <p:cNvPr id="70" name="Straight Arrow Connector 69"/>
+          <p:cNvCxnSpPr/>
+          <p:nvPr/>
+        </p:nvCxnSpPr>
+        <p:spPr>
+          <a:xfrm>
+            <a:off x="6220222" y="3835873"/>
             <a:ext cx="0" cy="457200"/>
           </a:xfrm>
           <a:prstGeom prst="straightConnector1">

</xml_diff>